<commit_message>
Changes to GCM ppt
</commit_message>
<xml_diff>
--- a/PPT/GCM UI.pptx
+++ b/PPT/GCM UI.pptx
@@ -881,7 +881,11 @@
         <a:p>
           <a:r>
             <a:rPr lang="en-US" u="sng" dirty="0" smtClean="0"/>
-            <a:t>Technologies Used</a:t>
+            <a:t>Technologies Currently </a:t>
+          </a:r>
+          <a:r>
+            <a:rPr lang="en-US" u="sng" dirty="0" smtClean="0"/>
+            <a:t>Used</a:t>
           </a:r>
           <a:endParaRPr lang="en-US" u="sng" dirty="0"/>
         </a:p>
@@ -1054,6 +1058,10 @@
           <a:r>
             <a:rPr lang="en-US" dirty="0" err="1" smtClean="0"/>
             <a:t>AngularJS</a:t>
+          </a:r>
+          <a:r>
+            <a:rPr lang="en-US" dirty="0" smtClean="0"/>
+            <a:t>:</a:t>
           </a:r>
           <a:endParaRPr lang="en-US" dirty="0" smtClean="0"/>
         </a:p>
@@ -1377,7 +1385,11 @@
           </a:pPr>
           <a:r>
             <a:rPr lang="en-US" sz="2400" u="sng" kern="1200" dirty="0" smtClean="0"/>
-            <a:t>Technologies Used</a:t>
+            <a:t>Technologies Currently </a:t>
+          </a:r>
+          <a:r>
+            <a:rPr lang="en-US" sz="2400" u="sng" kern="1200" dirty="0" smtClean="0"/>
+            <a:t>Used</a:t>
           </a:r>
           <a:endParaRPr lang="en-US" sz="2400" u="sng" kern="1200" dirty="0"/>
         </a:p>
@@ -1800,6 +1812,10 @@
           <a:r>
             <a:rPr lang="en-US" sz="1900" kern="1200" dirty="0" err="1" smtClean="0"/>
             <a:t>AngularJS</a:t>
+          </a:r>
+          <a:r>
+            <a:rPr lang="en-US" sz="1900" kern="1200" dirty="0" smtClean="0"/>
+            <a:t>:</a:t>
           </a:r>
           <a:endParaRPr lang="en-US" sz="1900" kern="1200" dirty="0" smtClean="0"/>
         </a:p>
@@ -8476,7 +8492,7 @@
           <p:nvPr>
             <p:extLst>
               <p:ext uri="{D42A27DB-BD31-4B8C-83A1-F6EECF244321}">
-                <p14:modId xmlns:p14="http://schemas.microsoft.com/office/powerpoint/2010/main" val="3339758978"/>
+                <p14:modId xmlns:p14="http://schemas.microsoft.com/office/powerpoint/2010/main" val="4202402404"/>
               </p:ext>
             </p:extLst>
           </p:nvPr>

</xml_diff>